<commit_message>
add videos of online demos for backup purposes
</commit_message>
<xml_diff>
--- a/Presentation.pptx
+++ b/Presentation.pptx
@@ -5,7 +5,7 @@
     <p:sldMasterId id="2147483668" r:id="rId1"/>
   </p:sldMasterIdLst>
   <p:notesMasterIdLst>
-    <p:notesMasterId r:id="rId22"/>
+    <p:notesMasterId r:id="rId23"/>
   </p:notesMasterIdLst>
   <p:sldIdLst>
     <p:sldId id="256" r:id="rId2"/>
@@ -19,15 +19,16 @@
     <p:sldId id="269" r:id="rId10"/>
     <p:sldId id="271" r:id="rId11"/>
     <p:sldId id="270" r:id="rId12"/>
-    <p:sldId id="266" r:id="rId13"/>
-    <p:sldId id="265" r:id="rId14"/>
-    <p:sldId id="273" r:id="rId15"/>
-    <p:sldId id="274" r:id="rId16"/>
-    <p:sldId id="275" r:id="rId17"/>
-    <p:sldId id="268" r:id="rId18"/>
-    <p:sldId id="267" r:id="rId19"/>
-    <p:sldId id="272" r:id="rId20"/>
-    <p:sldId id="264" r:id="rId21"/>
+    <p:sldId id="276" r:id="rId13"/>
+    <p:sldId id="266" r:id="rId14"/>
+    <p:sldId id="265" r:id="rId15"/>
+    <p:sldId id="273" r:id="rId16"/>
+    <p:sldId id="274" r:id="rId17"/>
+    <p:sldId id="275" r:id="rId18"/>
+    <p:sldId id="268" r:id="rId19"/>
+    <p:sldId id="267" r:id="rId20"/>
+    <p:sldId id="272" r:id="rId21"/>
+    <p:sldId id="264" r:id="rId22"/>
   </p:sldIdLst>
   <p:sldSz cx="12192000" cy="6858000"/>
   <p:notesSz cx="6858000" cy="9144000"/>
@@ -146,6 +147,7 @@
             <p14:sldId id="269"/>
             <p14:sldId id="271"/>
             <p14:sldId id="270"/>
+            <p14:sldId id="276"/>
             <p14:sldId id="266"/>
             <p14:sldId id="265"/>
             <p14:sldId id="273"/>
@@ -265,9 +267,7 @@
               <c:showPercent val="1"/>
               <c:showBubbleSize val="0"/>
               <c:extLst>
-                <c:ext xmlns:c15="http://schemas.microsoft.com/office/drawing/2012/chart" uri="{CE6537A1-D6FC-4f65-9D91-7224C49458BB}">
-                  <c15:layout/>
-                </c:ext>
+                <c:ext xmlns:c15="http://schemas.microsoft.com/office/drawing/2012/chart" uri="{CE6537A1-D6FC-4f65-9D91-7224C49458BB}"/>
                 <c:ext xmlns:c16="http://schemas.microsoft.com/office/drawing/2014/chart" uri="{C3380CC4-5D6E-409C-BE32-E72D297353CC}">
                   <c16:uniqueId val="{00000001-84CD-4B32-AC75-67A0F3EBBE3C}"/>
                 </c:ext>
@@ -289,9 +289,7 @@
               <c:showPercent val="1"/>
               <c:showBubbleSize val="0"/>
               <c:extLst>
-                <c:ext xmlns:c15="http://schemas.microsoft.com/office/drawing/2012/chart" uri="{CE6537A1-D6FC-4f65-9D91-7224C49458BB}">
-                  <c15:layout/>
-                </c:ext>
+                <c:ext xmlns:c15="http://schemas.microsoft.com/office/drawing/2012/chart" uri="{CE6537A1-D6FC-4f65-9D91-7224C49458BB}"/>
                 <c:ext xmlns:c16="http://schemas.microsoft.com/office/drawing/2014/chart" uri="{C3380CC4-5D6E-409C-BE32-E72D297353CC}">
                   <c16:uniqueId val="{00000003-84CD-4B32-AC75-67A0F3EBBE3C}"/>
                 </c:ext>
@@ -313,9 +311,7 @@
               <c:showPercent val="1"/>
               <c:showBubbleSize val="0"/>
               <c:extLst>
-                <c:ext xmlns:c15="http://schemas.microsoft.com/office/drawing/2012/chart" uri="{CE6537A1-D6FC-4f65-9D91-7224C49458BB}">
-                  <c15:layout/>
-                </c:ext>
+                <c:ext xmlns:c15="http://schemas.microsoft.com/office/drawing/2012/chart" uri="{CE6537A1-D6FC-4f65-9D91-7224C49458BB}"/>
                 <c:ext xmlns:c16="http://schemas.microsoft.com/office/drawing/2014/chart" uri="{C3380CC4-5D6E-409C-BE32-E72D297353CC}">
                   <c16:uniqueId val="{00000005-84CD-4B32-AC75-67A0F3EBBE3C}"/>
                 </c:ext>
@@ -1107,7 +1103,7 @@
           <a:p>
             <a:fld id="{D98B8BF6-A8F6-45E4-934F-66193C77F253}" type="datetimeFigureOut">
               <a:rPr lang="en-US" smtClean="0"/>
-              <a:t>2/22/2018</a:t>
+              <a:t>2/28/2018</a:t>
             </a:fld>
             <a:endParaRPr lang="en-US"/>
           </a:p>
@@ -1171,38 +1167,37 @@
           <a:p>
             <a:pPr lvl="0"/>
             <a:r>
-              <a:rPr lang="en-US" smtClean="0"/>
+              <a:rPr lang="en-US"/>
               <a:t>Edit Master text styles</a:t>
             </a:r>
           </a:p>
           <a:p>
             <a:pPr lvl="1"/>
             <a:r>
-              <a:rPr lang="en-US" smtClean="0"/>
+              <a:rPr lang="en-US"/>
               <a:t>Second level</a:t>
             </a:r>
           </a:p>
           <a:p>
             <a:pPr lvl="2"/>
             <a:r>
-              <a:rPr lang="en-US" smtClean="0"/>
+              <a:rPr lang="en-US"/>
               <a:t>Third level</a:t>
             </a:r>
           </a:p>
           <a:p>
             <a:pPr lvl="3"/>
             <a:r>
-              <a:rPr lang="en-US" smtClean="0"/>
+              <a:rPr lang="en-US"/>
               <a:t>Fourth level</a:t>
             </a:r>
           </a:p>
           <a:p>
             <a:pPr lvl="4"/>
             <a:r>
-              <a:rPr lang="en-US" smtClean="0"/>
+              <a:rPr lang="en-US"/>
               <a:t>Fifth level</a:t>
             </a:r>
-            <a:endParaRPr lang="en-US"/>
           </a:p>
         </p:txBody>
       </p:sp>
@@ -1420,11 +1415,11 @@
           <a:lstStyle/>
           <a:p>
             <a:r>
-              <a:rPr lang="en-US" dirty="0" smtClean="0"/>
+              <a:rPr lang="en-US" dirty="0"/>
               <a:t>Build…easy.</a:t>
             </a:r>
             <a:r>
-              <a:rPr lang="en-US" baseline="0" dirty="0" smtClean="0"/>
+              <a:rPr lang="en-US" baseline="0" dirty="0"/>
               <a:t>  Deploy…easy.  Unit tests? A month and a couple thousand lines of code later I gave that up</a:t>
             </a:r>
             <a:endParaRPr lang="en-US" dirty="0"/>
@@ -1448,7 +1443,7 @@
           <a:p>
             <a:fld id="{72EB332F-D54A-4050-A012-A33A569E7EAC}" type="slidenum">
               <a:rPr lang="en-US" smtClean="0"/>
-              <a:t>15</a:t>
+              <a:t>16</a:t>
             </a:fld>
             <a:endParaRPr lang="en-US"/>
           </a:p>
@@ -1512,23 +1507,23 @@
           <a:lstStyle/>
           <a:p>
             <a:r>
-              <a:rPr lang="en-US" dirty="0" smtClean="0"/>
+              <a:rPr lang="en-US" dirty="0"/>
               <a:t>Deploy</a:t>
             </a:r>
             <a:r>
-              <a:rPr lang="en-US" baseline="0" dirty="0" smtClean="0"/>
+              <a:rPr lang="en-US" baseline="0" dirty="0"/>
               <a:t> a virtual appliance in the cloud.  Two things needed:</a:t>
             </a:r>
           </a:p>
           <a:p>
             <a:r>
-              <a:rPr lang="en-US" baseline="0" dirty="0" smtClean="0"/>
+              <a:rPr lang="en-US" baseline="0" dirty="0"/>
               <a:t>ARM Template</a:t>
             </a:r>
           </a:p>
           <a:p>
             <a:r>
-              <a:rPr lang="en-US" baseline="0" dirty="0" smtClean="0"/>
+              <a:rPr lang="en-US" baseline="0" dirty="0"/>
               <a:t>Authentication info</a:t>
             </a:r>
             <a:endParaRPr lang="en-US" dirty="0"/>
@@ -1552,7 +1547,7 @@
           <a:p>
             <a:fld id="{72EB332F-D54A-4050-A012-A33A569E7EAC}" type="slidenum">
               <a:rPr lang="en-US" smtClean="0"/>
-              <a:t>16</a:t>
+              <a:t>17</a:t>
             </a:fld>
             <a:endParaRPr lang="en-US"/>
           </a:p>
@@ -1616,25 +1611,25 @@
           <a:lstStyle/>
           <a:p>
             <a:r>
-              <a:rPr lang="en-US" dirty="0" smtClean="0"/>
+              <a:rPr lang="en-US" dirty="0"/>
               <a:t>Here’s the problem.  When</a:t>
             </a:r>
             <a:r>
-              <a:rPr lang="en-US" baseline="0" dirty="0" smtClean="0"/>
+              <a:rPr lang="en-US" baseline="0" dirty="0"/>
               <a:t> you mock invoke-</a:t>
             </a:r>
             <a:r>
-              <a:rPr lang="en-US" baseline="0" dirty="0" err="1" smtClean="0"/>
+              <a:rPr lang="en-US" baseline="0" dirty="0" err="1"/>
               <a:t>restmethod</a:t>
             </a:r>
             <a:r>
-              <a:rPr lang="en-US" baseline="0" dirty="0" smtClean="0"/>
+              <a:rPr lang="en-US" baseline="0" dirty="0"/>
               <a:t> you basically have to reverse engineer your API.</a:t>
             </a:r>
           </a:p>
           <a:p>
             <a:r>
-              <a:rPr lang="en-US" baseline="0" dirty="0" smtClean="0"/>
+              <a:rPr lang="en-US" baseline="0" dirty="0"/>
               <a:t>Or write a specific mock for every test</a:t>
             </a:r>
             <a:endParaRPr lang="en-US" dirty="0"/>
@@ -1658,7 +1653,7 @@
           <a:p>
             <a:fld id="{72EB332F-D54A-4050-A012-A33A569E7EAC}" type="slidenum">
               <a:rPr lang="en-US" smtClean="0"/>
-              <a:t>17</a:t>
+              <a:t>18</a:t>
             </a:fld>
             <a:endParaRPr lang="en-US"/>
           </a:p>
@@ -1892,7 +1887,7 @@
             <a:fld id="{B61BEF0D-F0BB-DE4B-95CE-6DB70DBA9567}" type="datetimeFigureOut">
               <a:rPr lang="en-US" smtClean="0"/>
               <a:pPr/>
-              <a:t>2/22/2018</a:t>
+              <a:t>2/28/2018</a:t>
             </a:fld>
             <a:endParaRPr lang="en-US" dirty="0"/>
           </a:p>
@@ -2472,7 +2467,7 @@
             <a:fld id="{B61BEF0D-F0BB-DE4B-95CE-6DB70DBA9567}" type="datetimeFigureOut">
               <a:rPr lang="en-US" smtClean="0"/>
               <a:pPr/>
-              <a:t>2/22/2018</a:t>
+              <a:t>2/28/2018</a:t>
             </a:fld>
             <a:endParaRPr lang="en-US" dirty="0"/>
           </a:p>
@@ -2714,7 +2709,7 @@
             <a:fld id="{B61BEF0D-F0BB-DE4B-95CE-6DB70DBA9567}" type="datetimeFigureOut">
               <a:rPr lang="en-US" smtClean="0"/>
               <a:pPr/>
-              <a:t>2/22/2018</a:t>
+              <a:t>2/28/2018</a:t>
             </a:fld>
             <a:endParaRPr lang="en-US" dirty="0"/>
           </a:p>
@@ -2970,7 +2965,7 @@
             <a:fld id="{B61BEF0D-F0BB-DE4B-95CE-6DB70DBA9567}" type="datetimeFigureOut">
               <a:rPr lang="en-US" smtClean="0"/>
               <a:pPr/>
-              <a:t>2/22/2018</a:t>
+              <a:t>2/28/2018</a:t>
             </a:fld>
             <a:endParaRPr lang="en-US" dirty="0"/>
           </a:p>
@@ -3331,7 +3326,7 @@
             <a:fld id="{B61BEF0D-F0BB-DE4B-95CE-6DB70DBA9567}" type="datetimeFigureOut">
               <a:rPr lang="en-US" smtClean="0"/>
               <a:pPr/>
-              <a:t>2/22/2018</a:t>
+              <a:t>2/28/2018</a:t>
             </a:fld>
             <a:endParaRPr lang="en-US" dirty="0"/>
           </a:p>
@@ -3445,7 +3440,7 @@
             <a:fld id="{B61BEF0D-F0BB-DE4B-95CE-6DB70DBA9567}" type="datetimeFigureOut">
               <a:rPr lang="en-US" smtClean="0"/>
               <a:pPr/>
-              <a:t>2/22/2018</a:t>
+              <a:t>2/28/2018</a:t>
             </a:fld>
             <a:endParaRPr lang="en-US" dirty="0"/>
           </a:p>
@@ -3537,7 +3532,7 @@
             <a:fld id="{B61BEF0D-F0BB-DE4B-95CE-6DB70DBA9567}" type="datetimeFigureOut">
               <a:rPr lang="en-US" smtClean="0"/>
               <a:pPr/>
-              <a:t>2/22/2018</a:t>
+              <a:t>2/28/2018</a:t>
             </a:fld>
             <a:endParaRPr lang="en-US" dirty="0"/>
           </a:p>
@@ -3809,7 +3804,7 @@
             <a:fld id="{B61BEF0D-F0BB-DE4B-95CE-6DB70DBA9567}" type="datetimeFigureOut">
               <a:rPr lang="en-US" smtClean="0"/>
               <a:pPr/>
-              <a:t>2/22/2018</a:t>
+              <a:t>2/28/2018</a:t>
             </a:fld>
             <a:endParaRPr lang="en-US" dirty="0"/>
           </a:p>
@@ -4058,7 +4053,7 @@
             <a:fld id="{B61BEF0D-F0BB-DE4B-95CE-6DB70DBA9567}" type="datetimeFigureOut">
               <a:rPr lang="en-US" smtClean="0"/>
               <a:pPr/>
-              <a:t>2/22/2018</a:t>
+              <a:t>2/28/2018</a:t>
             </a:fld>
             <a:endParaRPr lang="en-US" dirty="0"/>
           </a:p>
@@ -4269,7 +4264,7 @@
             <a:fld id="{B61BEF0D-F0BB-DE4B-95CE-6DB70DBA9567}" type="datetimeFigureOut">
               <a:rPr lang="en-US" smtClean="0"/>
               <a:pPr/>
-              <a:t>2/22/2018</a:t>
+              <a:t>2/28/2018</a:t>
             </a:fld>
             <a:endParaRPr lang="en-US" dirty="0"/>
           </a:p>
@@ -4770,21 +4765,6 @@
   <p:clrMapOvr>
     <a:masterClrMapping/>
   </p:clrMapOvr>
-  <mc:AlternateContent xmlns:mc="http://schemas.openxmlformats.org/markup-compatibility/2006" xmlns:p14="http://schemas.microsoft.com/office/powerpoint/2010/main">
-    <mc:Choice Requires="p14">
-      <p:transition spd="slow" p14:dur="2000"/>
-    </mc:Choice>
-    <mc:Fallback xmlns="">
-      <p:transition spd="slow"/>
-    </mc:Fallback>
-  </mc:AlternateContent>
-  <p:timing>
-    <p:tnLst>
-      <p:par>
-        <p:cTn id="1" dur="indefinite" restart="never" nodeType="tmRoot"/>
-      </p:par>
-    </p:tnLst>
-  </p:timing>
 </p:sld>
 </file>
 
@@ -4821,71 +4801,57 @@
           <a:lstStyle/>
           <a:p>
             <a:r>
-              <a:rPr lang="en-US" dirty="0" smtClean="0"/>
+              <a:rPr lang="en-US" dirty="0"/>
               <a:t>But Why?</a:t>
             </a:r>
+          </a:p>
+        </p:txBody>
+      </p:sp>
+      <p:sp>
+        <p:nvSpPr>
+          <p:cNvPr id="5" name="Content Placeholder 4"/>
+          <p:cNvSpPr>
+            <a:spLocks noGrp="1"/>
+          </p:cNvSpPr>
+          <p:nvPr>
+            <p:ph idx="1"/>
+          </p:nvPr>
+        </p:nvSpPr>
+        <p:spPr/>
+        <p:txBody>
+          <a:bodyPr/>
+          <a:lstStyle/>
+          <a:p>
+            <a:r>
+              <a:rPr lang="en-US" dirty="0"/>
+              <a:t>More Code Separation</a:t>
+            </a:r>
+          </a:p>
+          <a:p>
+            <a:pPr lvl="1"/>
+            <a:r>
+              <a:rPr lang="en-US" dirty="0"/>
+              <a:t>Class definitions interface between REST API and </a:t>
+            </a:r>
+            <a:r>
+              <a:rPr lang="en-US" dirty="0" err="1"/>
+              <a:t>powershell</a:t>
+            </a:r>
             <a:endParaRPr lang="en-US" dirty="0"/>
           </a:p>
-        </p:txBody>
-      </p:sp>
-      <p:sp>
-        <p:nvSpPr>
-          <p:cNvPr id="5" name="Content Placeholder 4"/>
-          <p:cNvSpPr>
-            <a:spLocks noGrp="1"/>
-          </p:cNvSpPr>
-          <p:nvPr>
-            <p:ph idx="1"/>
-          </p:nvPr>
-        </p:nvSpPr>
-        <p:spPr/>
-        <p:txBody>
-          <a:bodyPr/>
-          <a:lstStyle/>
-          <a:p>
-            <a:r>
-              <a:rPr lang="en-US" dirty="0" smtClean="0"/>
-              <a:t>More Code Separation</a:t>
-            </a:r>
-          </a:p>
           <a:p>
             <a:pPr lvl="1"/>
             <a:r>
-              <a:rPr lang="en-US" dirty="0" smtClean="0"/>
-              <a:t>Class definitions interface between REST API and </a:t>
-            </a:r>
-            <a:r>
-              <a:rPr lang="en-US" dirty="0" err="1" smtClean="0"/>
+              <a:rPr lang="en-US" dirty="0"/>
+              <a:t>Cmdlets interface between </a:t>
+            </a:r>
+            <a:r>
+              <a:rPr lang="en-US" dirty="0" err="1"/>
               <a:t>powershell</a:t>
             </a:r>
-            <a:endParaRPr lang="en-US" dirty="0" smtClean="0"/>
-          </a:p>
-          <a:p>
-            <a:pPr lvl="1"/>
-            <a:r>
-              <a:rPr lang="en-US" dirty="0" smtClean="0"/>
-              <a:t>Cmdlets interface between </a:t>
-            </a:r>
-            <a:r>
-              <a:rPr lang="en-US" dirty="0" err="1" smtClean="0"/>
-              <a:t>powershell</a:t>
-            </a:r>
-            <a:r>
-              <a:rPr lang="en-US" dirty="0" smtClean="0"/>
+            <a:r>
+              <a:rPr lang="en-US" dirty="0"/>
               <a:t> and the user</a:t>
-            </a:r>
-          </a:p>
-          <a:p>
-            <a:r>
-              <a:rPr lang="en-US" dirty="0" smtClean="0"/>
-              <a:t>Cleaner Parameter validation</a:t>
-            </a:r>
-            <a:endParaRPr lang="en-US" dirty="0"/>
-          </a:p>
-          <a:p>
-            <a:r>
-              <a:rPr lang="en-US" dirty="0" smtClean="0"/>
-              <a:t>Why not?</a:t>
             </a:r>
           </a:p>
         </p:txBody>
@@ -4900,13 +4866,6 @@
   <p:clrMapOvr>
     <a:masterClrMapping/>
   </p:clrMapOvr>
-  <p:timing>
-    <p:tnLst>
-      <p:par>
-        <p:cTn id="1" dur="indefinite" restart="never" nodeType="tmRoot"/>
-      </p:par>
-    </p:tnLst>
-  </p:timing>
 </p:sld>
 </file>
 
@@ -4943,18 +4902,9 @@
           <a:lstStyle/>
           <a:p>
             <a:r>
-              <a:rPr lang="en-US" dirty="0" smtClean="0"/>
-              <a:t>But </a:t>
-            </a:r>
-            <a:r>
-              <a:rPr lang="en-US" dirty="0" smtClean="0"/>
-              <a:t>Why</a:t>
-            </a:r>
-            <a:r>
-              <a:rPr lang="en-US" dirty="0" smtClean="0"/>
-              <a:t>?</a:t>
-            </a:r>
-            <a:endParaRPr lang="en-US" dirty="0"/>
+              <a:rPr lang="en-US" dirty="0"/>
+              <a:t>But Why?</a:t>
+            </a:r>
           </a:p>
         </p:txBody>
       </p:sp>
@@ -5158,7 +5108,7 @@
               <a:buNone/>
             </a:pPr>
             <a:r>
-              <a:rPr lang="en-US" sz="1400" dirty="0" err="1" smtClean="0">
+              <a:rPr lang="en-US" sz="1400" dirty="0" err="1">
                 <a:solidFill>
                   <a:srgbClr val="00008B"/>
                 </a:solidFill>
@@ -5167,7 +5117,7 @@
               <a:t>Param</a:t>
             </a:r>
             <a:r>
-              <a:rPr lang="en-US" sz="1400" dirty="0" smtClean="0">
+              <a:rPr lang="en-US" sz="1400" dirty="0">
                 <a:solidFill>
                   <a:srgbClr val="333333"/>
                 </a:solidFill>
@@ -5234,19 +5184,10 @@
                 </a:solidFill>
                 <a:latin typeface="Consolas" panose="020B0609020204030204" pitchFamily="49" charset="0"/>
               </a:rPr>
-              <a:t>[</a:t>
-            </a:r>
-            <a:r>
-              <a:rPr lang="en-US" sz="1400" dirty="0" smtClean="0">
-                <a:solidFill>
-                  <a:srgbClr val="333333"/>
-                </a:solidFill>
-                <a:latin typeface="Consolas" panose="020B0609020204030204" pitchFamily="49" charset="0"/>
-              </a:rPr>
-              <a:t>Parameter(</a:t>
-            </a:r>
-            <a:r>
-              <a:rPr lang="en-US" sz="1400" dirty="0" smtClean="0">
+              <a:t>[Parameter(</a:t>
+            </a:r>
+            <a:r>
+              <a:rPr lang="en-US" sz="1400" dirty="0">
                 <a:solidFill>
                   <a:srgbClr val="008080"/>
                 </a:solidFill>
@@ -5333,15 +5274,6 @@
             <a:pPr marL="457200" lvl="1" indent="0">
               <a:buNone/>
             </a:pPr>
-            <a:r>
-              <a:rPr lang="en-US" sz="1400" dirty="0">
-                <a:solidFill>
-                  <a:srgbClr val="333333"/>
-                </a:solidFill>
-                <a:latin typeface="Consolas" panose="020B0609020204030204" pitchFamily="49" charset="0"/>
-              </a:rPr>
-              <a:t/>
-            </a:r>
             <a:br>
               <a:rPr lang="en-US" sz="1400" dirty="0">
                 <a:solidFill>
@@ -5389,19 +5321,10 @@
                 </a:solidFill>
                 <a:latin typeface="Consolas" panose="020B0609020204030204" pitchFamily="49" charset="0"/>
               </a:rPr>
-              <a:t>[</a:t>
-            </a:r>
-            <a:r>
-              <a:rPr lang="en-US" sz="1400" dirty="0" smtClean="0">
-                <a:solidFill>
-                  <a:srgbClr val="333333"/>
-                </a:solidFill>
-                <a:latin typeface="Consolas" panose="020B0609020204030204" pitchFamily="49" charset="0"/>
-              </a:rPr>
-              <a:t>Parameter(</a:t>
-            </a:r>
-            <a:r>
-              <a:rPr lang="en-US" sz="1400" dirty="0" smtClean="0">
+              <a:t>[Parameter(</a:t>
+            </a:r>
+            <a:r>
+              <a:rPr lang="en-US" sz="1400" dirty="0">
                 <a:solidFill>
                   <a:srgbClr val="008080"/>
                 </a:solidFill>
@@ -5487,7 +5410,7 @@
               <a:t>numericalvalue</a:t>
             </a:r>
             <a:r>
-              <a:rPr lang="en-US" sz="1400" dirty="0" smtClean="0">
+              <a:rPr lang="en-US" sz="1400" dirty="0">
                 <a:solidFill>
                   <a:srgbClr val="A9A9A9"/>
                 </a:solidFill>
@@ -5550,19 +5473,10 @@
                 </a:solidFill>
                 <a:latin typeface="Consolas" panose="020B0609020204030204" pitchFamily="49" charset="0"/>
               </a:rPr>
-              <a:t>[</a:t>
-            </a:r>
-            <a:r>
-              <a:rPr lang="en-US" sz="1400" dirty="0" smtClean="0">
-                <a:solidFill>
-                  <a:srgbClr val="333333"/>
-                </a:solidFill>
-                <a:latin typeface="Consolas" panose="020B0609020204030204" pitchFamily="49" charset="0"/>
-              </a:rPr>
-              <a:t>Parameter(</a:t>
-            </a:r>
-            <a:r>
-              <a:rPr lang="en-US" sz="1400" dirty="0" smtClean="0">
+              <a:t>[Parameter(</a:t>
+            </a:r>
+            <a:r>
+              <a:rPr lang="en-US" sz="1400" dirty="0">
                 <a:solidFill>
                   <a:srgbClr val="008080"/>
                 </a:solidFill>
@@ -5609,19 +5523,10 @@
                 </a:solidFill>
                 <a:latin typeface="Consolas" panose="020B0609020204030204" pitchFamily="49" charset="0"/>
               </a:rPr>
-              <a:t>[</a:t>
-            </a:r>
-            <a:r>
-              <a:rPr lang="en-US" sz="1400" dirty="0" smtClean="0">
-                <a:solidFill>
-                  <a:srgbClr val="333333"/>
-                </a:solidFill>
-                <a:latin typeface="Consolas" panose="020B0609020204030204" pitchFamily="49" charset="0"/>
-              </a:rPr>
-              <a:t>Parameter(</a:t>
-            </a:r>
-            <a:r>
-              <a:rPr lang="en-US" sz="1400" dirty="0" err="1" smtClean="0">
+              <a:t>[Parameter(</a:t>
+            </a:r>
+            <a:r>
+              <a:rPr lang="en-US" sz="1400" dirty="0" err="1">
                 <a:solidFill>
                   <a:srgbClr val="008080"/>
                 </a:solidFill>
@@ -5682,7 +5587,7 @@
               <a:buNone/>
             </a:pPr>
             <a:r>
-              <a:rPr lang="en-US" sz="1400" dirty="0" smtClean="0">
+              <a:rPr lang="en-US" sz="1400" dirty="0">
                 <a:solidFill>
                   <a:srgbClr val="00008B"/>
                 </a:solidFill>
@@ -5709,17 +5614,90 @@
   <p:clrMapOvr>
     <a:masterClrMapping/>
   </p:clrMapOvr>
-  <p:timing>
-    <p:tnLst>
-      <p:par>
-        <p:cTn id="1" dur="indefinite" restart="never" nodeType="tmRoot"/>
-      </p:par>
-    </p:tnLst>
-  </p:timing>
 </p:sld>
 </file>
 
 <file path=ppt/slides/slide12.xml><?xml version="1.0" encoding="utf-8"?>
+<p:sld xmlns:a="http://schemas.openxmlformats.org/drawingml/2006/main" xmlns:r="http://schemas.openxmlformats.org/officeDocument/2006/relationships" xmlns:p="http://schemas.openxmlformats.org/presentationml/2006/main">
+  <p:cSld>
+    <p:spTree>
+      <p:nvGrpSpPr>
+        <p:cNvPr id="1" name=""/>
+        <p:cNvGrpSpPr/>
+        <p:nvPr/>
+      </p:nvGrpSpPr>
+      <p:grpSpPr>
+        <a:xfrm>
+          <a:off x="0" y="0"/>
+          <a:ext cx="0" cy="0"/>
+          <a:chOff x="0" y="0"/>
+          <a:chExt cx="0" cy="0"/>
+        </a:xfrm>
+      </p:grpSpPr>
+      <p:sp>
+        <p:nvSpPr>
+          <p:cNvPr id="2" name="Title 1"/>
+          <p:cNvSpPr>
+            <a:spLocks noGrp="1"/>
+          </p:cNvSpPr>
+          <p:nvPr>
+            <p:ph type="title"/>
+          </p:nvPr>
+        </p:nvSpPr>
+        <p:spPr/>
+        <p:txBody>
+          <a:bodyPr/>
+          <a:lstStyle/>
+          <a:p>
+            <a:r>
+              <a:rPr lang="en-US" dirty="0"/>
+              <a:t>But Why?</a:t>
+            </a:r>
+          </a:p>
+        </p:txBody>
+      </p:sp>
+      <p:sp>
+        <p:nvSpPr>
+          <p:cNvPr id="5" name="Content Placeholder 4"/>
+          <p:cNvSpPr>
+            <a:spLocks noGrp="1"/>
+          </p:cNvSpPr>
+          <p:nvPr>
+            <p:ph idx="1"/>
+          </p:nvPr>
+        </p:nvSpPr>
+        <p:spPr/>
+        <p:txBody>
+          <a:bodyPr/>
+          <a:lstStyle/>
+          <a:p>
+            <a:r>
+              <a:rPr lang="en-US" dirty="0"/>
+              <a:t>Why not?</a:t>
+            </a:r>
+          </a:p>
+          <a:p>
+            <a:pPr marL="0" indent="0">
+              <a:buNone/>
+            </a:pPr>
+            <a:endParaRPr lang="en-US" dirty="0"/>
+          </a:p>
+        </p:txBody>
+      </p:sp>
+    </p:spTree>
+    <p:extLst>
+      <p:ext uri="{BB962C8B-B14F-4D97-AF65-F5344CB8AC3E}">
+        <p14:creationId xmlns:p14="http://schemas.microsoft.com/office/powerpoint/2010/main" val="914536776"/>
+      </p:ext>
+    </p:extLst>
+  </p:cSld>
+  <p:clrMapOvr>
+    <a:masterClrMapping/>
+  </p:clrMapOvr>
+</p:sld>
+</file>
+
+<file path=ppt/slides/slide13.xml><?xml version="1.0" encoding="utf-8"?>
 <p:sld xmlns:a="http://schemas.openxmlformats.org/drawingml/2006/main" xmlns:r="http://schemas.openxmlformats.org/officeDocument/2006/relationships" xmlns:p="http://schemas.openxmlformats.org/presentationml/2006/main" show="0">
   <p:cSld>
     <p:spTree>
@@ -5934,26 +5912,17 @@
           </a:p>
           <a:p>
             <a:r>
-              <a:rPr lang="en-US" dirty="0" smtClean="0"/>
+              <a:rPr lang="en-US" dirty="0"/>
               <a:t>Extensible attributes, or “</a:t>
             </a:r>
             <a:r>
-              <a:rPr lang="en-US" dirty="0" err="1" smtClean="0"/>
+              <a:rPr lang="en-US" dirty="0" err="1"/>
               <a:t>extattr</a:t>
             </a:r>
             <a:r>
-              <a:rPr lang="en-US" dirty="0" smtClean="0"/>
-              <a:t>” </a:t>
-            </a:r>
-            <a:r>
-              <a:rPr lang="en-US" dirty="0"/>
-              <a:t>is like object tagging</a:t>
-            </a:r>
-            <a:r>
-              <a:rPr lang="en-US" dirty="0" smtClean="0"/>
-              <a:t>.</a:t>
-            </a:r>
-            <a:endParaRPr lang="en-US" dirty="0"/>
+              <a:rPr lang="en-US" dirty="0"/>
+              <a:t>” is like object tagging.</a:t>
+            </a:r>
           </a:p>
           <a:p>
             <a:r>
@@ -6030,86 +5999,6 @@
   <p:clrMapOvr>
     <a:masterClrMapping/>
   </p:clrMapOvr>
-  <mc:AlternateContent xmlns:mc="http://schemas.openxmlformats.org/markup-compatibility/2006" xmlns:p14="http://schemas.microsoft.com/office/powerpoint/2010/main">
-    <mc:Choice Requires="p14">
-      <p:transition spd="slow" p14:dur="2000"/>
-    </mc:Choice>
-    <mc:Fallback xmlns="">
-      <p:transition spd="slow"/>
-    </mc:Fallback>
-  </mc:AlternateContent>
-  <p:timing>
-    <p:tnLst>
-      <p:par>
-        <p:cTn id="1" dur="indefinite" restart="never" nodeType="tmRoot"/>
-      </p:par>
-    </p:tnLst>
-  </p:timing>
-</p:sld>
-</file>
-
-<file path=ppt/slides/slide13.xml><?xml version="1.0" encoding="utf-8"?>
-<p:sld xmlns:a="http://schemas.openxmlformats.org/drawingml/2006/main" xmlns:r="http://schemas.openxmlformats.org/officeDocument/2006/relationships" xmlns:p="http://schemas.openxmlformats.org/presentationml/2006/main">
-  <p:cSld>
-    <p:spTree>
-      <p:nvGrpSpPr>
-        <p:cNvPr id="1" name=""/>
-        <p:cNvGrpSpPr/>
-        <p:nvPr/>
-      </p:nvGrpSpPr>
-      <p:grpSpPr>
-        <a:xfrm>
-          <a:off x="0" y="0"/>
-          <a:ext cx="0" cy="0"/>
-          <a:chOff x="0" y="0"/>
-          <a:chExt cx="0" cy="0"/>
-        </a:xfrm>
-      </p:grpSpPr>
-      <p:sp>
-        <p:nvSpPr>
-          <p:cNvPr id="2" name="Content Placeholder 1">
-            <a:extLst>
-              <a:ext uri="{FF2B5EF4-FFF2-40B4-BE49-F238E27FC236}">
-                <a16:creationId xmlns:a16="http://schemas.microsoft.com/office/drawing/2014/main" id="{16F50367-CCF8-43B5-9C4E-F40739DC5231}"/>
-              </a:ext>
-            </a:extLst>
-          </p:cNvPr>
-          <p:cNvSpPr>
-            <a:spLocks noGrp="1"/>
-          </p:cNvSpPr>
-          <p:nvPr>
-            <p:ph sz="quarter" idx="13"/>
-          </p:nvPr>
-        </p:nvSpPr>
-        <p:spPr/>
-        <p:txBody>
-          <a:bodyPr/>
-          <a:lstStyle/>
-          <a:p>
-            <a:pPr marL="0" indent="0">
-              <a:buNone/>
-            </a:pPr>
-            <a:endParaRPr lang="en-US" dirty="0"/>
-          </a:p>
-        </p:txBody>
-      </p:sp>
-    </p:spTree>
-    <p:extLst>
-      <p:ext uri="{BB962C8B-B14F-4D97-AF65-F5344CB8AC3E}">
-        <p14:creationId xmlns:p14="http://schemas.microsoft.com/office/powerpoint/2010/main" val="3973683924"/>
-      </p:ext>
-    </p:extLst>
-  </p:cSld>
-  <p:clrMapOvr>
-    <a:masterClrMapping/>
-  </p:clrMapOvr>
-  <p:timing>
-    <p:tnLst>
-      <p:par>
-        <p:cTn id="1" dur="indefinite" restart="never" nodeType="tmRoot"/>
-      </p:par>
-    </p:tnLst>
-  </p:timing>
 </p:sld>
 </file>
 
@@ -6132,12 +6021,18 @@
       </p:grpSpPr>
       <p:sp>
         <p:nvSpPr>
-          <p:cNvPr id="5" name="Title 4"/>
-          <p:cNvSpPr>
-            <a:spLocks noGrp="1"/>
-          </p:cNvSpPr>
-          <p:nvPr>
-            <p:ph type="title"/>
+          <p:cNvPr id="2" name="Content Placeholder 1">
+            <a:extLst>
+              <a:ext uri="{FF2B5EF4-FFF2-40B4-BE49-F238E27FC236}">
+                <a16:creationId xmlns:a16="http://schemas.microsoft.com/office/drawing/2014/main" id="{16F50367-CCF8-43B5-9C4E-F40739DC5231}"/>
+              </a:ext>
+            </a:extLst>
+          </p:cNvPr>
+          <p:cNvSpPr>
+            <a:spLocks noGrp="1"/>
+          </p:cNvSpPr>
+          <p:nvPr>
+            <p:ph sz="quarter" idx="13"/>
           </p:nvPr>
         </p:nvSpPr>
         <p:spPr/>
@@ -6145,33 +6040,9 @@
           <a:bodyPr/>
           <a:lstStyle/>
           <a:p>
-            <a:r>
-              <a:rPr lang="en-US" dirty="0" smtClean="0"/>
-              <a:t>Release Pipeline</a:t>
-            </a:r>
-            <a:endParaRPr lang="en-US" dirty="0"/>
-          </a:p>
-        </p:txBody>
-      </p:sp>
-      <p:sp>
-        <p:nvSpPr>
-          <p:cNvPr id="6" name="Text Placeholder 5"/>
-          <p:cNvSpPr>
-            <a:spLocks noGrp="1"/>
-          </p:cNvSpPr>
-          <p:nvPr>
-            <p:ph type="body" idx="1"/>
-          </p:nvPr>
-        </p:nvSpPr>
-        <p:spPr/>
-        <p:txBody>
-          <a:bodyPr/>
-          <a:lstStyle/>
-          <a:p>
-            <a:r>
-              <a:rPr lang="en-US" dirty="0" smtClean="0"/>
-              <a:t>Build…Test…Deploy</a:t>
-            </a:r>
+            <a:pPr marL="0" indent="0">
+              <a:buNone/>
+            </a:pPr>
             <a:endParaRPr lang="en-US" dirty="0"/>
           </a:p>
         </p:txBody>
@@ -6179,20 +6050,13 @@
     </p:spTree>
     <p:extLst>
       <p:ext uri="{BB962C8B-B14F-4D97-AF65-F5344CB8AC3E}">
-        <p14:creationId xmlns:p14="http://schemas.microsoft.com/office/powerpoint/2010/main" val="793227249"/>
+        <p14:creationId xmlns:p14="http://schemas.microsoft.com/office/powerpoint/2010/main" val="3973683924"/>
       </p:ext>
     </p:extLst>
   </p:cSld>
   <p:clrMapOvr>
     <a:masterClrMapping/>
   </p:clrMapOvr>
-  <p:timing>
-    <p:tnLst>
-      <p:par>
-        <p:cTn id="1" dur="indefinite" restart="never" nodeType="tmRoot"/>
-      </p:par>
-    </p:tnLst>
-  </p:timing>
 </p:sld>
 </file>
 
@@ -6215,6 +6079,80 @@
       </p:grpSpPr>
       <p:sp>
         <p:nvSpPr>
+          <p:cNvPr id="5" name="Title 4"/>
+          <p:cNvSpPr>
+            <a:spLocks noGrp="1"/>
+          </p:cNvSpPr>
+          <p:nvPr>
+            <p:ph type="title"/>
+          </p:nvPr>
+        </p:nvSpPr>
+        <p:spPr/>
+        <p:txBody>
+          <a:bodyPr/>
+          <a:lstStyle/>
+          <a:p>
+            <a:r>
+              <a:rPr lang="en-US" dirty="0"/>
+              <a:t>Release Pipeline</a:t>
+            </a:r>
+          </a:p>
+        </p:txBody>
+      </p:sp>
+      <p:sp>
+        <p:nvSpPr>
+          <p:cNvPr id="6" name="Text Placeholder 5"/>
+          <p:cNvSpPr>
+            <a:spLocks noGrp="1"/>
+          </p:cNvSpPr>
+          <p:nvPr>
+            <p:ph type="body" idx="1"/>
+          </p:nvPr>
+        </p:nvSpPr>
+        <p:spPr/>
+        <p:txBody>
+          <a:bodyPr/>
+          <a:lstStyle/>
+          <a:p>
+            <a:r>
+              <a:rPr lang="en-US" dirty="0"/>
+              <a:t>Build…Test…Deploy</a:t>
+            </a:r>
+          </a:p>
+        </p:txBody>
+      </p:sp>
+    </p:spTree>
+    <p:extLst>
+      <p:ext uri="{BB962C8B-B14F-4D97-AF65-F5344CB8AC3E}">
+        <p14:creationId xmlns:p14="http://schemas.microsoft.com/office/powerpoint/2010/main" val="793227249"/>
+      </p:ext>
+    </p:extLst>
+  </p:cSld>
+  <p:clrMapOvr>
+    <a:masterClrMapping/>
+  </p:clrMapOvr>
+</p:sld>
+</file>
+
+<file path=ppt/slides/slide16.xml><?xml version="1.0" encoding="utf-8"?>
+<p:sld xmlns:a="http://schemas.openxmlformats.org/drawingml/2006/main" xmlns:r="http://schemas.openxmlformats.org/officeDocument/2006/relationships" xmlns:p="http://schemas.openxmlformats.org/presentationml/2006/main">
+  <p:cSld>
+    <p:spTree>
+      <p:nvGrpSpPr>
+        <p:cNvPr id="1" name=""/>
+        <p:cNvGrpSpPr/>
+        <p:nvPr/>
+      </p:nvGrpSpPr>
+      <p:grpSpPr>
+        <a:xfrm>
+          <a:off x="0" y="0"/>
+          <a:ext cx="0" cy="0"/>
+          <a:chOff x="0" y="0"/>
+          <a:chExt cx="0" cy="0"/>
+        </a:xfrm>
+      </p:grpSpPr>
+      <p:sp>
+        <p:nvSpPr>
           <p:cNvPr id="2" name="Title 1"/>
           <p:cNvSpPr>
             <a:spLocks noGrp="1"/>
@@ -6229,10 +6167,9 @@
           <a:lstStyle/>
           <a:p>
             <a:r>
-              <a:rPr lang="en-US" dirty="0" smtClean="0"/>
+              <a:rPr lang="en-US" dirty="0"/>
               <a:t>Release Pipeline	</a:t>
             </a:r>
-            <a:endParaRPr lang="en-US" dirty="0"/>
           </a:p>
         </p:txBody>
       </p:sp>
@@ -6259,7 +6196,7 @@
               </a:lnSpc>
             </a:pPr>
             <a:r>
-              <a:rPr lang="en-US" dirty="0" smtClean="0"/>
+              <a:rPr lang="en-US" dirty="0"/>
               <a:t>Build</a:t>
             </a:r>
           </a:p>
@@ -6281,7 +6218,7 @@
               </a:lnSpc>
             </a:pPr>
             <a:r>
-              <a:rPr lang="en-US" dirty="0" smtClean="0"/>
+              <a:rPr lang="en-US" dirty="0"/>
               <a:t>combine script files into psm1</a:t>
             </a:r>
           </a:p>
@@ -6292,7 +6229,7 @@
               </a:lnSpc>
             </a:pPr>
             <a:r>
-              <a:rPr lang="en-US" dirty="0" smtClean="0"/>
+              <a:rPr lang="en-US" dirty="0"/>
               <a:t>set module manifest</a:t>
             </a:r>
           </a:p>
@@ -6303,14 +6240,14 @@
               </a:lnSpc>
             </a:pPr>
             <a:r>
-              <a:rPr lang="en-US" dirty="0" smtClean="0"/>
+              <a:rPr lang="en-US" dirty="0"/>
               <a:t>compile help files with </a:t>
             </a:r>
             <a:r>
-              <a:rPr lang="en-US" dirty="0" err="1" smtClean="0"/>
+              <a:rPr lang="en-US" dirty="0" err="1"/>
               <a:t>platyPS</a:t>
             </a:r>
-            <a:endParaRPr lang="en-US" dirty="0" smtClean="0"/>
+            <a:endParaRPr lang="en-US" dirty="0"/>
           </a:p>
           <a:p>
             <a:pPr>
@@ -6319,14 +6256,14 @@
               </a:lnSpc>
             </a:pPr>
             <a:r>
-              <a:rPr lang="en-US" dirty="0" smtClean="0"/>
+              <a:rPr lang="en-US" dirty="0"/>
               <a:t>Test – unit test by mocking Invoke-</a:t>
             </a:r>
             <a:r>
-              <a:rPr lang="en-US" dirty="0" err="1" smtClean="0"/>
+              <a:rPr lang="en-US" dirty="0" err="1"/>
               <a:t>RestMethod</a:t>
             </a:r>
-            <a:endParaRPr lang="en-US" dirty="0" smtClean="0"/>
+            <a:endParaRPr lang="en-US" dirty="0"/>
           </a:p>
           <a:p>
             <a:pPr>
@@ -6335,18 +6272,17 @@
               </a:lnSpc>
             </a:pPr>
             <a:r>
-              <a:rPr lang="en-US" dirty="0" smtClean="0"/>
+              <a:rPr lang="en-US" dirty="0"/>
               <a:t>Deploy – publish module to the </a:t>
             </a:r>
             <a:r>
-              <a:rPr lang="en-US" dirty="0" err="1" smtClean="0"/>
+              <a:rPr lang="en-US" dirty="0" err="1"/>
               <a:t>Powershell</a:t>
             </a:r>
             <a:r>
-              <a:rPr lang="en-US" dirty="0" smtClean="0"/>
+              <a:rPr lang="en-US" dirty="0"/>
               <a:t> Gallery</a:t>
             </a:r>
-            <a:endParaRPr lang="en-US" dirty="0"/>
           </a:p>
         </p:txBody>
       </p:sp>
@@ -6667,7 +6603,7 @@
 </p:sld>
 </file>
 
-<file path=ppt/slides/slide16.xml><?xml version="1.0" encoding="utf-8"?>
+<file path=ppt/slides/slide17.xml><?xml version="1.0" encoding="utf-8"?>
 <p:sld xmlns:a="http://schemas.openxmlformats.org/drawingml/2006/main" xmlns:r="http://schemas.openxmlformats.org/officeDocument/2006/relationships" xmlns:p="http://schemas.openxmlformats.org/presentationml/2006/main">
   <p:cSld>
     <p:spTree>
@@ -6700,10 +6636,9 @@
           <a:lstStyle/>
           <a:p>
             <a:r>
-              <a:rPr lang="en-US" dirty="0" smtClean="0"/>
+              <a:rPr lang="en-US" dirty="0"/>
               <a:t>To The Cloud!</a:t>
             </a:r>
-            <a:endParaRPr lang="en-US" dirty="0"/>
           </a:p>
         </p:txBody>
       </p:sp>
@@ -6746,17 +6681,10 @@
   <p:clrMapOvr>
     <a:masterClrMapping/>
   </p:clrMapOvr>
-  <p:timing>
-    <p:tnLst>
-      <p:par>
-        <p:cTn id="1" dur="indefinite" restart="never" nodeType="tmRoot"/>
-      </p:par>
-    </p:tnLst>
-  </p:timing>
 </p:sld>
 </file>
 
-<file path=ppt/slides/slide17.xml><?xml version="1.0" encoding="utf-8"?>
+<file path=ppt/slides/slide18.xml><?xml version="1.0" encoding="utf-8"?>
 <p:sld xmlns:a="http://schemas.openxmlformats.org/drawingml/2006/main" xmlns:r="http://schemas.openxmlformats.org/officeDocument/2006/relationships" xmlns:p="http://schemas.openxmlformats.org/presentationml/2006/main" show="0">
   <p:cSld>
     <p:spTree>
@@ -6790,10 +6718,9 @@
           <a:p>
             <a:pPr algn="r"/>
             <a:r>
-              <a:rPr lang="en-US" dirty="0" smtClean="0"/>
+              <a:rPr lang="en-US" dirty="0"/>
               <a:t>Always test your code!.....</a:t>
             </a:r>
-            <a:endParaRPr lang="en-US" dirty="0"/>
           </a:p>
         </p:txBody>
       </p:sp>
@@ -6832,25 +6759,10 @@
   <p:clrMapOvr>
     <a:masterClrMapping/>
   </p:clrMapOvr>
-  <mc:AlternateContent xmlns:mc="http://schemas.openxmlformats.org/markup-compatibility/2006">
-    <mc:Choice xmlns:p14="http://schemas.microsoft.com/office/powerpoint/2010/main" Requires="p14">
-      <p:transition spd="slow" p14:dur="2000"/>
-    </mc:Choice>
-    <mc:Fallback>
-      <p:transition spd="slow"/>
-    </mc:Fallback>
-  </mc:AlternateContent>
-  <p:timing>
-    <p:tnLst>
-      <p:par>
-        <p:cTn id="1" dur="indefinite" restart="never" nodeType="tmRoot"/>
-      </p:par>
-    </p:tnLst>
-  </p:timing>
 </p:sld>
 </file>
 
-<file path=ppt/slides/slide18.xml><?xml version="1.0" encoding="utf-8"?>
+<file path=ppt/slides/slide19.xml><?xml version="1.0" encoding="utf-8"?>
 <p:sld xmlns:a="http://schemas.openxmlformats.org/drawingml/2006/main" xmlns:r="http://schemas.openxmlformats.org/officeDocument/2006/relationships" xmlns:p="http://schemas.openxmlformats.org/presentationml/2006/main">
   <p:cSld>
     <p:spTree>
@@ -7004,10 +6916,9 @@
           <a:p>
             <a:pPr algn="ctr"/>
             <a:r>
-              <a:rPr lang="en-US" dirty="0" smtClean="0"/>
+              <a:rPr lang="en-US" dirty="0"/>
               <a:t>Psake.ps1</a:t>
             </a:r>
-            <a:endParaRPr lang="en-US" dirty="0"/>
           </a:p>
         </p:txBody>
       </p:sp>
@@ -7035,10 +6946,9 @@
           <a:p>
             <a:pPr algn="ctr"/>
             <a:r>
-              <a:rPr lang="en-US" dirty="0" smtClean="0"/>
+              <a:rPr lang="en-US" dirty="0"/>
               <a:t>Release Pipeline</a:t>
             </a:r>
-            <a:endParaRPr lang="en-US" dirty="0"/>
           </a:p>
         </p:txBody>
       </p:sp>
@@ -7079,10 +6989,9 @@
           <a:p>
             <a:pPr algn="ctr"/>
             <a:r>
-              <a:rPr lang="en-US" dirty="0" smtClean="0"/>
+              <a:rPr lang="en-US" dirty="0"/>
               <a:t>clean</a:t>
             </a:r>
-            <a:endParaRPr lang="en-US" dirty="0"/>
           </a:p>
         </p:txBody>
       </p:sp>
@@ -7123,10 +7032,9 @@
           <a:p>
             <a:pPr algn="ctr"/>
             <a:r>
-              <a:rPr lang="en-US" dirty="0" smtClean="0"/>
+              <a:rPr lang="en-US" dirty="0"/>
               <a:t>build</a:t>
             </a:r>
-            <a:endParaRPr lang="en-US" dirty="0"/>
           </a:p>
         </p:txBody>
       </p:sp>
@@ -7167,10 +7075,9 @@
           <a:p>
             <a:pPr algn="ctr"/>
             <a:r>
-              <a:rPr lang="en-US" dirty="0" smtClean="0"/>
+              <a:rPr lang="en-US" dirty="0"/>
               <a:t>test</a:t>
             </a:r>
-            <a:endParaRPr lang="en-US" dirty="0"/>
           </a:p>
         </p:txBody>
       </p:sp>
@@ -7212,11 +7119,7 @@
             <a:pPr algn="ctr"/>
             <a:r>
               <a:rPr lang="en-US" dirty="0" err="1"/>
-              <a:t>i</a:t>
-            </a:r>
-            <a:r>
-              <a:rPr lang="en-US" dirty="0" err="1" smtClean="0"/>
-              <a:t>nit</a:t>
+              <a:t>init</a:t>
             </a:r>
             <a:endParaRPr lang="en-US" dirty="0"/>
           </a:p>
@@ -7260,14 +7163,10 @@
             <a:pPr algn="ctr"/>
             <a:r>
               <a:rPr lang="en-US" dirty="0"/>
-              <a:t>b</a:t>
-            </a:r>
-            <a:r>
-              <a:rPr lang="en-US" dirty="0" smtClean="0"/>
-              <a:t>uild test </a:t>
-            </a:r>
-            <a:r>
-              <a:rPr lang="en-US" dirty="0" err="1" smtClean="0"/>
+              <a:t>build test </a:t>
+            </a:r>
+            <a:r>
+              <a:rPr lang="en-US" dirty="0" err="1"/>
               <a:t>env</a:t>
             </a:r>
             <a:endParaRPr lang="en-US" dirty="0"/>
@@ -7311,10 +7210,9 @@
           <a:p>
             <a:pPr algn="ctr"/>
             <a:r>
-              <a:rPr lang="en-US" dirty="0" smtClean="0"/>
+              <a:rPr lang="en-US" dirty="0"/>
               <a:t>deploy</a:t>
             </a:r>
-            <a:endParaRPr lang="en-US" dirty="0"/>
           </a:p>
         </p:txBody>
       </p:sp>
@@ -7355,10 +7253,9 @@
           <a:p>
             <a:pPr algn="ctr"/>
             <a:r>
-              <a:rPr lang="en-US" dirty="0" smtClean="0"/>
+              <a:rPr lang="en-US" dirty="0"/>
               <a:t>Build.ps1</a:t>
             </a:r>
-            <a:endParaRPr lang="en-US" dirty="0"/>
           </a:p>
         </p:txBody>
       </p:sp>
@@ -7399,11 +7296,11 @@
           <a:p>
             <a:pPr algn="ctr"/>
             <a:r>
-              <a:rPr lang="en-US" dirty="0" smtClean="0"/>
+              <a:rPr lang="en-US" dirty="0"/>
               <a:t>Appveyor. </a:t>
             </a:r>
             <a:r>
-              <a:rPr lang="en-US" dirty="0" err="1" smtClean="0"/>
+              <a:rPr lang="en-US" dirty="0" err="1"/>
               <a:t>yml</a:t>
             </a:r>
             <a:endParaRPr lang="en-US" dirty="0"/>
@@ -7447,10 +7344,9 @@
           <a:p>
             <a:pPr algn="ctr"/>
             <a:r>
-              <a:rPr lang="en-US" dirty="0" smtClean="0"/>
+              <a:rPr lang="en-US" dirty="0"/>
               <a:t>Appveyor. ps1</a:t>
             </a:r>
-            <a:endParaRPr lang="en-US" dirty="0"/>
           </a:p>
         </p:txBody>
       </p:sp>
@@ -8079,138 +7975,6 @@
 </p:sld>
 </file>
 
-<file path=ppt/slides/slide19.xml><?xml version="1.0" encoding="utf-8"?>
-<p:sld xmlns:a="http://schemas.openxmlformats.org/drawingml/2006/main" xmlns:r="http://schemas.openxmlformats.org/officeDocument/2006/relationships" xmlns:p="http://schemas.openxmlformats.org/presentationml/2006/main">
-  <p:cSld>
-    <p:spTree>
-      <p:nvGrpSpPr>
-        <p:cNvPr id="1" name=""/>
-        <p:cNvGrpSpPr/>
-        <p:nvPr/>
-      </p:nvGrpSpPr>
-      <p:grpSpPr>
-        <a:xfrm>
-          <a:off x="0" y="0"/>
-          <a:ext cx="0" cy="0"/>
-          <a:chOff x="0" y="0"/>
-          <a:chExt cx="0" cy="0"/>
-        </a:xfrm>
-      </p:grpSpPr>
-      <p:sp>
-        <p:nvSpPr>
-          <p:cNvPr id="2" name="Title 1"/>
-          <p:cNvSpPr>
-            <a:spLocks noGrp="1"/>
-          </p:cNvSpPr>
-          <p:nvPr>
-            <p:ph type="title"/>
-          </p:nvPr>
-        </p:nvSpPr>
-        <p:spPr/>
-        <p:txBody>
-          <a:bodyPr/>
-          <a:lstStyle/>
-          <a:p>
-            <a:pPr algn="r"/>
-            <a:r>
-              <a:rPr lang="en-US" dirty="0" smtClean="0"/>
-              <a:t>Reference links</a:t>
-            </a:r>
-            <a:endParaRPr lang="en-US" dirty="0"/>
-          </a:p>
-        </p:txBody>
-      </p:sp>
-      <p:sp>
-        <p:nvSpPr>
-          <p:cNvPr id="3" name="Content Placeholder 2"/>
-          <p:cNvSpPr>
-            <a:spLocks noGrp="1"/>
-          </p:cNvSpPr>
-          <p:nvPr>
-            <p:ph idx="1"/>
-          </p:nvPr>
-        </p:nvSpPr>
-        <p:spPr>
-          <a:xfrm>
-            <a:off x="3953164" y="1825625"/>
-            <a:ext cx="7400636" cy="4351338"/>
-          </a:xfrm>
-        </p:spPr>
-        <p:txBody>
-          <a:bodyPr>
-            <a:normAutofit/>
-          </a:bodyPr>
-          <a:lstStyle/>
-          <a:p>
-            <a:r>
-              <a:rPr lang="en-US" sz="2000" dirty="0">
-                <a:hlinkClick r:id="rId2"/>
-              </a:rPr>
-              <a:t>https://</a:t>
-            </a:r>
-            <a:r>
-              <a:rPr lang="en-US" sz="2000" dirty="0" smtClean="0">
-                <a:hlinkClick r:id="rId2"/>
-              </a:rPr>
-              <a:t>github.com/murrahjm/Infoblox-Classy</a:t>
-            </a:r>
-            <a:endParaRPr lang="en-US" sz="2000" dirty="0" smtClean="0"/>
-          </a:p>
-          <a:p>
-            <a:r>
-              <a:rPr lang="en-US" sz="2000" dirty="0">
-                <a:hlinkClick r:id="rId3"/>
-              </a:rPr>
-              <a:t>http://ramblingcookiemonster.github.io/PSDeploy-Inception</a:t>
-            </a:r>
-            <a:r>
-              <a:rPr lang="en-US" sz="2000" dirty="0" smtClean="0">
-                <a:hlinkClick r:id="rId3"/>
-              </a:rPr>
-              <a:t>/</a:t>
-            </a:r>
-            <a:endParaRPr lang="en-US" sz="2000" dirty="0" smtClean="0"/>
-          </a:p>
-          <a:p>
-            <a:r>
-              <a:rPr lang="en-US" sz="1800" dirty="0">
-                <a:hlinkClick r:id="rId4"/>
-              </a:rPr>
-              <a:t>https://</a:t>
-            </a:r>
-            <a:r>
-              <a:rPr lang="en-US" sz="1800" dirty="0" smtClean="0">
-                <a:hlinkClick r:id="rId4"/>
-              </a:rPr>
-              <a:t>docs.microsoft.com/en-us/powershell/wmf/5.0/class_newtype</a:t>
-            </a:r>
-            <a:endParaRPr lang="en-US" sz="1800" dirty="0" smtClean="0"/>
-          </a:p>
-          <a:p>
-            <a:endParaRPr lang="en-US" sz="2000" dirty="0"/>
-          </a:p>
-        </p:txBody>
-      </p:sp>
-    </p:spTree>
-    <p:extLst>
-      <p:ext uri="{BB962C8B-B14F-4D97-AF65-F5344CB8AC3E}">
-        <p14:creationId xmlns:p14="http://schemas.microsoft.com/office/powerpoint/2010/main" val="276757675"/>
-      </p:ext>
-    </p:extLst>
-  </p:cSld>
-  <p:clrMapOvr>
-    <a:masterClrMapping/>
-  </p:clrMapOvr>
-  <p:timing>
-    <p:tnLst>
-      <p:par>
-        <p:cTn id="1" dur="indefinite" restart="never" nodeType="tmRoot"/>
-      </p:par>
-    </p:tnLst>
-  </p:timing>
-</p:sld>
-</file>
-
 <file path=ppt/slides/slide2.xml><?xml version="1.0" encoding="utf-8"?>
 <p:sld xmlns:a="http://schemas.openxmlformats.org/drawingml/2006/main" xmlns:r="http://schemas.openxmlformats.org/officeDocument/2006/relationships" xmlns:p="http://schemas.openxmlformats.org/presentationml/2006/main" show="0">
   <p:cSld>
@@ -8302,25 +8066,116 @@
   <p:clrMapOvr>
     <a:masterClrMapping/>
   </p:clrMapOvr>
-  <mc:AlternateContent xmlns:mc="http://schemas.openxmlformats.org/markup-compatibility/2006" xmlns:p14="http://schemas.microsoft.com/office/powerpoint/2010/main">
-    <mc:Choice Requires="p14">
-      <p:transition spd="slow" p14:dur="2000"/>
-    </mc:Choice>
-    <mc:Fallback xmlns="">
-      <p:transition spd="slow"/>
-    </mc:Fallback>
-  </mc:AlternateContent>
-  <p:timing>
-    <p:tnLst>
-      <p:par>
-        <p:cTn id="1" dur="indefinite" restart="never" nodeType="tmRoot"/>
-      </p:par>
-    </p:tnLst>
-  </p:timing>
 </p:sld>
 </file>
 
 <file path=ppt/slides/slide20.xml><?xml version="1.0" encoding="utf-8"?>
+<p:sld xmlns:a="http://schemas.openxmlformats.org/drawingml/2006/main" xmlns:r="http://schemas.openxmlformats.org/officeDocument/2006/relationships" xmlns:p="http://schemas.openxmlformats.org/presentationml/2006/main">
+  <p:cSld>
+    <p:spTree>
+      <p:nvGrpSpPr>
+        <p:cNvPr id="1" name=""/>
+        <p:cNvGrpSpPr/>
+        <p:nvPr/>
+      </p:nvGrpSpPr>
+      <p:grpSpPr>
+        <a:xfrm>
+          <a:off x="0" y="0"/>
+          <a:ext cx="0" cy="0"/>
+          <a:chOff x="0" y="0"/>
+          <a:chExt cx="0" cy="0"/>
+        </a:xfrm>
+      </p:grpSpPr>
+      <p:sp>
+        <p:nvSpPr>
+          <p:cNvPr id="2" name="Title 1"/>
+          <p:cNvSpPr>
+            <a:spLocks noGrp="1"/>
+          </p:cNvSpPr>
+          <p:nvPr>
+            <p:ph type="title"/>
+          </p:nvPr>
+        </p:nvSpPr>
+        <p:spPr/>
+        <p:txBody>
+          <a:bodyPr/>
+          <a:lstStyle/>
+          <a:p>
+            <a:pPr algn="r"/>
+            <a:r>
+              <a:rPr lang="en-US" dirty="0"/>
+              <a:t>Reference links</a:t>
+            </a:r>
+          </a:p>
+        </p:txBody>
+      </p:sp>
+      <p:sp>
+        <p:nvSpPr>
+          <p:cNvPr id="3" name="Content Placeholder 2"/>
+          <p:cNvSpPr>
+            <a:spLocks noGrp="1"/>
+          </p:cNvSpPr>
+          <p:nvPr>
+            <p:ph idx="1"/>
+          </p:nvPr>
+        </p:nvSpPr>
+        <p:spPr>
+          <a:xfrm>
+            <a:off x="3953164" y="1825625"/>
+            <a:ext cx="7400636" cy="4351338"/>
+          </a:xfrm>
+        </p:spPr>
+        <p:txBody>
+          <a:bodyPr>
+            <a:normAutofit/>
+          </a:bodyPr>
+          <a:lstStyle/>
+          <a:p>
+            <a:r>
+              <a:rPr lang="en-US" sz="2000" dirty="0">
+                <a:hlinkClick r:id="rId2"/>
+              </a:rPr>
+              <a:t>https://github.com/murrahjm/Infoblox-Classy</a:t>
+            </a:r>
+            <a:endParaRPr lang="en-US" sz="2000" dirty="0"/>
+          </a:p>
+          <a:p>
+            <a:r>
+              <a:rPr lang="en-US" sz="2000" dirty="0">
+                <a:hlinkClick r:id="rId3"/>
+              </a:rPr>
+              <a:t>http://ramblingcookiemonster.github.io/PSDeploy-Inception/</a:t>
+            </a:r>
+            <a:endParaRPr lang="en-US" sz="2000" dirty="0"/>
+          </a:p>
+          <a:p>
+            <a:r>
+              <a:rPr lang="en-US" sz="1800" dirty="0">
+                <a:hlinkClick r:id="rId4"/>
+              </a:rPr>
+              <a:t>https://docs.microsoft.com/en-us/powershell/wmf/5.0/class_newtype</a:t>
+            </a:r>
+            <a:endParaRPr lang="en-US" sz="1800" dirty="0"/>
+          </a:p>
+          <a:p>
+            <a:endParaRPr lang="en-US" sz="2000" dirty="0"/>
+          </a:p>
+        </p:txBody>
+      </p:sp>
+    </p:spTree>
+    <p:extLst>
+      <p:ext uri="{BB962C8B-B14F-4D97-AF65-F5344CB8AC3E}">
+        <p14:creationId xmlns:p14="http://schemas.microsoft.com/office/powerpoint/2010/main" val="276757675"/>
+      </p:ext>
+    </p:extLst>
+  </p:cSld>
+  <p:clrMapOvr>
+    <a:masterClrMapping/>
+  </p:clrMapOvr>
+</p:sld>
+</file>
+
+<file path=ppt/slides/slide21.xml><?xml version="1.0" encoding="utf-8"?>
 <p:sld xmlns:a="http://schemas.openxmlformats.org/drawingml/2006/main" xmlns:r="http://schemas.openxmlformats.org/officeDocument/2006/relationships" xmlns:p="http://schemas.openxmlformats.org/presentationml/2006/main">
   <p:cSld>
     <p:spTree>
@@ -8347,13 +8202,6 @@
   <p:clrMapOvr>
     <a:masterClrMapping/>
   </p:clrMapOvr>
-  <p:timing>
-    <p:tnLst>
-      <p:par>
-        <p:cTn id="1" dur="indefinite" restart="never" nodeType="tmRoot"/>
-      </p:par>
-    </p:tnLst>
-  </p:timing>
 </p:sld>
 </file>
 
@@ -8440,21 +8288,6 @@
   <p:clrMapOvr>
     <a:masterClrMapping/>
   </p:clrMapOvr>
-  <mc:AlternateContent xmlns:mc="http://schemas.openxmlformats.org/markup-compatibility/2006" xmlns:p14="http://schemas.microsoft.com/office/powerpoint/2010/main">
-    <mc:Choice Requires="p14">
-      <p:transition spd="slow" p14:dur="2000"/>
-    </mc:Choice>
-    <mc:Fallback xmlns="">
-      <p:transition spd="slow"/>
-    </mc:Fallback>
-  </mc:AlternateContent>
-  <p:timing>
-    <p:tnLst>
-      <p:par>
-        <p:cTn id="1" dur="indefinite" restart="never" nodeType="tmRoot"/>
-      </p:par>
-    </p:tnLst>
-  </p:timing>
 </p:sld>
 </file>
 
@@ -8549,21 +8382,6 @@
   <p:clrMapOvr>
     <a:masterClrMapping/>
   </p:clrMapOvr>
-  <mc:AlternateContent xmlns:mc="http://schemas.openxmlformats.org/markup-compatibility/2006" xmlns:p14="http://schemas.microsoft.com/office/powerpoint/2010/main">
-    <mc:Choice Requires="p14">
-      <p:transition spd="slow" p14:dur="2000"/>
-    </mc:Choice>
-    <mc:Fallback xmlns="">
-      <p:transition spd="slow"/>
-    </mc:Fallback>
-  </mc:AlternateContent>
-  <p:timing>
-    <p:tnLst>
-      <p:par>
-        <p:cTn id="1" dur="indefinite" restart="never" nodeType="tmRoot"/>
-      </p:par>
-    </p:tnLst>
-  </p:timing>
 </p:sld>
 </file>
 
@@ -8658,21 +8476,6 @@
   <p:clrMapOvr>
     <a:masterClrMapping/>
   </p:clrMapOvr>
-  <mc:AlternateContent xmlns:mc="http://schemas.openxmlformats.org/markup-compatibility/2006" xmlns:p14="http://schemas.microsoft.com/office/powerpoint/2010/main">
-    <mc:Choice Requires="p14">
-      <p:transition spd="slow" p14:dur="2000"/>
-    </mc:Choice>
-    <mc:Fallback xmlns="">
-      <p:transition spd="slow"/>
-    </mc:Fallback>
-  </mc:AlternateContent>
-  <p:timing>
-    <p:tnLst>
-      <p:par>
-        <p:cTn id="1" dur="indefinite" restart="never" nodeType="tmRoot"/>
-      </p:par>
-    </p:tnLst>
-  </p:timing>
 </p:sld>
 </file>
 
@@ -8765,21 +8568,6 @@
   <p:clrMapOvr>
     <a:masterClrMapping/>
   </p:clrMapOvr>
-  <mc:AlternateContent xmlns:mc="http://schemas.openxmlformats.org/markup-compatibility/2006" xmlns:p14="http://schemas.microsoft.com/office/powerpoint/2010/main">
-    <mc:Choice Requires="p14">
-      <p:transition spd="slow" p14:dur="2000"/>
-    </mc:Choice>
-    <mc:Fallback xmlns="">
-      <p:transition spd="slow"/>
-    </mc:Fallback>
-  </mc:AlternateContent>
-  <p:timing>
-    <p:tnLst>
-      <p:par>
-        <p:cTn id="1" dur="indefinite" restart="never" nodeType="tmRoot"/>
-      </p:par>
-    </p:tnLst>
-  </p:timing>
 </p:sld>
 </file>
 
@@ -8860,21 +8648,6 @@
   <p:clrMapOvr>
     <a:masterClrMapping/>
   </p:clrMapOvr>
-  <mc:AlternateContent xmlns:mc="http://schemas.openxmlformats.org/markup-compatibility/2006" xmlns:p14="http://schemas.microsoft.com/office/powerpoint/2010/main">
-    <mc:Choice Requires="p14">
-      <p:transition spd="slow" p14:dur="2000"/>
-    </mc:Choice>
-    <mc:Fallback xmlns="">
-      <p:transition spd="slow"/>
-    </mc:Fallback>
-  </mc:AlternateContent>
-  <p:timing>
-    <p:tnLst>
-      <p:par>
-        <p:cTn id="1" dur="indefinite" restart="never" nodeType="tmRoot"/>
-      </p:par>
-    </p:tnLst>
-  </p:timing>
 </p:sld>
 </file>
 
@@ -8961,13 +8734,6 @@
   <p:clrMapOvr>
     <a:masterClrMapping/>
   </p:clrMapOvr>
-  <p:timing>
-    <p:tnLst>
-      <p:par>
-        <p:cTn id="1" dur="indefinite" restart="never" nodeType="tmRoot"/>
-      </p:par>
-    </p:tnLst>
-  </p:timing>
 </p:sld>
 </file>
 
@@ -9004,10 +8770,9 @@
           <a:lstStyle/>
           <a:p>
             <a:r>
-              <a:rPr lang="en-US" dirty="0" smtClean="0"/>
+              <a:rPr lang="en-US" dirty="0"/>
               <a:t>REST API                           CLASSES</a:t>
             </a:r>
-            <a:endParaRPr lang="en-US" dirty="0"/>
           </a:p>
         </p:txBody>
       </p:sp>
@@ -9027,38 +8792,37 @@
           <a:lstStyle/>
           <a:p>
             <a:r>
-              <a:rPr lang="en-US" dirty="0" smtClean="0"/>
+              <a:rPr lang="en-US" dirty="0"/>
               <a:t>https://website/api/objecttype</a:t>
             </a:r>
           </a:p>
           <a:p>
             <a:pPr lvl="1"/>
             <a:r>
-              <a:rPr lang="en-US" dirty="0" smtClean="0"/>
+              <a:rPr lang="en-US" dirty="0"/>
               <a:t>PUT	update</a:t>
             </a:r>
           </a:p>
           <a:p>
             <a:pPr lvl="1"/>
             <a:r>
-              <a:rPr lang="en-US" dirty="0" smtClean="0"/>
+              <a:rPr lang="en-US" dirty="0"/>
               <a:t>GET	read</a:t>
             </a:r>
           </a:p>
           <a:p>
             <a:pPr lvl="1"/>
             <a:r>
-              <a:rPr lang="en-US" dirty="0" smtClean="0"/>
+              <a:rPr lang="en-US" dirty="0"/>
               <a:t>POST	create</a:t>
             </a:r>
           </a:p>
           <a:p>
             <a:pPr lvl="1"/>
             <a:r>
-              <a:rPr lang="en-US" dirty="0" smtClean="0"/>
+              <a:rPr lang="en-US" dirty="0"/>
               <a:t>DELETE	delete</a:t>
             </a:r>
-            <a:endParaRPr lang="en-US" dirty="0"/>
           </a:p>
         </p:txBody>
       </p:sp>
@@ -9078,30 +8842,30 @@
           <a:lstStyle/>
           <a:p>
             <a:r>
-              <a:rPr lang="en-US" dirty="0" smtClean="0"/>
+              <a:rPr lang="en-US" dirty="0"/>
               <a:t>Class </a:t>
             </a:r>
             <a:r>
-              <a:rPr lang="en-US" dirty="0" err="1" smtClean="0"/>
+              <a:rPr lang="en-US" dirty="0" err="1"/>
               <a:t>objecttype</a:t>
             </a:r>
             <a:r>
-              <a:rPr lang="en-US" dirty="0" smtClean="0"/>
+              <a:rPr lang="en-US" dirty="0"/>
               <a:t>{</a:t>
             </a:r>
           </a:p>
           <a:p>
             <a:pPr lvl="1"/>
             <a:r>
-              <a:rPr lang="en-US" dirty="0" smtClean="0"/>
+              <a:rPr lang="en-US" dirty="0"/>
               <a:t>Static </a:t>
             </a:r>
             <a:r>
-              <a:rPr lang="en-US" dirty="0" err="1" smtClean="0"/>
+              <a:rPr lang="en-US" dirty="0" err="1"/>
               <a:t>objecttype</a:t>
             </a:r>
             <a:r>
-              <a:rPr lang="en-US" dirty="0" smtClean="0"/>
+              <a:rPr lang="en-US" dirty="0"/>
               <a:t> create {}</a:t>
             </a:r>
           </a:p>
@@ -9109,51 +8873,46 @@
             <a:pPr lvl="1"/>
             <a:r>
               <a:rPr lang="en-US" dirty="0"/>
-              <a:t> </a:t>
-            </a:r>
-            <a:r>
-              <a:rPr lang="en-US" dirty="0" smtClean="0"/>
-              <a:t>          </a:t>
-            </a:r>
-            <a:r>
-              <a:rPr lang="en-US" dirty="0" err="1" smtClean="0"/>
+              <a:t>           </a:t>
+            </a:r>
+            <a:r>
+              <a:rPr lang="en-US" dirty="0" err="1"/>
               <a:t>objecttype</a:t>
             </a:r>
             <a:r>
-              <a:rPr lang="en-US" dirty="0" smtClean="0"/>
+              <a:rPr lang="en-US" dirty="0"/>
               <a:t> update {}</a:t>
             </a:r>
           </a:p>
           <a:p>
             <a:pPr lvl="1"/>
             <a:r>
-              <a:rPr lang="en-US" dirty="0" smtClean="0"/>
+              <a:rPr lang="en-US" dirty="0"/>
               <a:t>Static </a:t>
             </a:r>
             <a:r>
-              <a:rPr lang="en-US" dirty="0" err="1" smtClean="0"/>
+              <a:rPr lang="en-US" dirty="0" err="1"/>
               <a:t>objecttype</a:t>
             </a:r>
             <a:r>
-              <a:rPr lang="en-US" dirty="0" smtClean="0"/>
+              <a:rPr lang="en-US" dirty="0"/>
               <a:t> get {}</a:t>
             </a:r>
           </a:p>
           <a:p>
             <a:pPr lvl="1"/>
             <a:r>
-              <a:rPr lang="en-US" dirty="0" smtClean="0"/>
+              <a:rPr lang="en-US" dirty="0"/>
               <a:t>           </a:t>
             </a:r>
             <a:r>
-              <a:rPr lang="en-US" dirty="0" err="1" smtClean="0"/>
+              <a:rPr lang="en-US" dirty="0" err="1"/>
               <a:t>objecttype</a:t>
             </a:r>
             <a:r>
-              <a:rPr lang="en-US" dirty="0" smtClean="0"/>
+              <a:rPr lang="en-US" dirty="0"/>
               <a:t> delete {}</a:t>
             </a:r>
-            <a:endParaRPr lang="en-US" dirty="0"/>
           </a:p>
         </p:txBody>
       </p:sp>
@@ -9167,13 +8926,6 @@
   <p:clrMapOvr>
     <a:masterClrMapping/>
   </p:clrMapOvr>
-  <p:timing>
-    <p:tnLst>
-      <p:par>
-        <p:cTn id="1" dur="indefinite" restart="never" nodeType="tmRoot"/>
-      </p:par>
-    </p:tnLst>
-  </p:timing>
 </p:sld>
 </file>
 

</xml_diff>

<commit_message>
add some flavor images :p
</commit_message>
<xml_diff>
--- a/Presentation.pptx
+++ b/Presentation.pptx
@@ -231,7 +231,7 @@
           <a:p>
             <a:fld id="{D98B8BF6-A8F6-45E4-934F-66193C77F253}" type="datetimeFigureOut">
               <a:rPr lang="en-US" smtClean="0"/>
-              <a:t>3/11/2018</a:t>
+              <a:t>4/4/2018</a:t>
             </a:fld>
             <a:endParaRPr lang="en-US"/>
           </a:p>
@@ -909,7 +909,7 @@
             <a:fld id="{B61BEF0D-F0BB-DE4B-95CE-6DB70DBA9567}" type="datetimeFigureOut">
               <a:rPr lang="en-US" smtClean="0"/>
               <a:pPr/>
-              <a:t>3/11/2018</a:t>
+              <a:t>4/4/2018</a:t>
             </a:fld>
             <a:endParaRPr lang="en-US" dirty="0"/>
           </a:p>
@@ -1489,7 +1489,7 @@
             <a:fld id="{B61BEF0D-F0BB-DE4B-95CE-6DB70DBA9567}" type="datetimeFigureOut">
               <a:rPr lang="en-US" smtClean="0"/>
               <a:pPr/>
-              <a:t>3/11/2018</a:t>
+              <a:t>4/4/2018</a:t>
             </a:fld>
             <a:endParaRPr lang="en-US" dirty="0"/>
           </a:p>
@@ -1731,7 +1731,7 @@
             <a:fld id="{B61BEF0D-F0BB-DE4B-95CE-6DB70DBA9567}" type="datetimeFigureOut">
               <a:rPr lang="en-US" smtClean="0"/>
               <a:pPr/>
-              <a:t>3/11/2018</a:t>
+              <a:t>4/4/2018</a:t>
             </a:fld>
             <a:endParaRPr lang="en-US" dirty="0"/>
           </a:p>
@@ -1987,7 +1987,7 @@
             <a:fld id="{B61BEF0D-F0BB-DE4B-95CE-6DB70DBA9567}" type="datetimeFigureOut">
               <a:rPr lang="en-US" smtClean="0"/>
               <a:pPr/>
-              <a:t>3/11/2018</a:t>
+              <a:t>4/4/2018</a:t>
             </a:fld>
             <a:endParaRPr lang="en-US" dirty="0"/>
           </a:p>
@@ -2348,7 +2348,7 @@
             <a:fld id="{B61BEF0D-F0BB-DE4B-95CE-6DB70DBA9567}" type="datetimeFigureOut">
               <a:rPr lang="en-US" smtClean="0"/>
               <a:pPr/>
-              <a:t>3/11/2018</a:t>
+              <a:t>4/4/2018</a:t>
             </a:fld>
             <a:endParaRPr lang="en-US" dirty="0"/>
           </a:p>
@@ -2462,7 +2462,7 @@
             <a:fld id="{B61BEF0D-F0BB-DE4B-95CE-6DB70DBA9567}" type="datetimeFigureOut">
               <a:rPr lang="en-US" smtClean="0"/>
               <a:pPr/>
-              <a:t>3/11/2018</a:t>
+              <a:t>4/4/2018</a:t>
             </a:fld>
             <a:endParaRPr lang="en-US" dirty="0"/>
           </a:p>
@@ -2554,7 +2554,7 @@
             <a:fld id="{B61BEF0D-F0BB-DE4B-95CE-6DB70DBA9567}" type="datetimeFigureOut">
               <a:rPr lang="en-US" smtClean="0"/>
               <a:pPr/>
-              <a:t>3/11/2018</a:t>
+              <a:t>4/4/2018</a:t>
             </a:fld>
             <a:endParaRPr lang="en-US" dirty="0"/>
           </a:p>
@@ -2826,7 +2826,7 @@
             <a:fld id="{B61BEF0D-F0BB-DE4B-95CE-6DB70DBA9567}" type="datetimeFigureOut">
               <a:rPr lang="en-US" smtClean="0"/>
               <a:pPr/>
-              <a:t>3/11/2018</a:t>
+              <a:t>4/4/2018</a:t>
             </a:fld>
             <a:endParaRPr lang="en-US" dirty="0"/>
           </a:p>
@@ -3075,7 +3075,7 @@
             <a:fld id="{B61BEF0D-F0BB-DE4B-95CE-6DB70DBA9567}" type="datetimeFigureOut">
               <a:rPr lang="en-US" smtClean="0"/>
               <a:pPr/>
-              <a:t>3/11/2018</a:t>
+              <a:t>4/4/2018</a:t>
             </a:fld>
             <a:endParaRPr lang="en-US" dirty="0"/>
           </a:p>
@@ -3286,7 +3286,7 @@
             <a:fld id="{B61BEF0D-F0BB-DE4B-95CE-6DB70DBA9567}" type="datetimeFigureOut">
               <a:rPr lang="en-US" smtClean="0"/>
               <a:pPr/>
-              <a:t>3/11/2018</a:t>
+              <a:t>4/4/2018</a:t>
             </a:fld>
             <a:endParaRPr lang="en-US" dirty="0"/>
           </a:p>
@@ -3790,6 +3790,13 @@
   <p:clrMapOvr>
     <a:masterClrMapping/>
   </p:clrMapOvr>
+  <p:timing>
+    <p:tnLst>
+      <p:par>
+        <p:cTn id="1" dur="indefinite" restart="never" nodeType="tmRoot"/>
+      </p:par>
+    </p:tnLst>
+  </p:timing>
 </p:sld>
 </file>
 
@@ -5069,10 +5076,36 @@
           <a:lstStyle/>
           <a:p>
             <a:r>
+              <a:rPr lang="en-US" sz="2000" dirty="0" smtClean="0">
+                <a:hlinkClick r:id="rId2"/>
+              </a:rPr>
+              <a:t>https</a:t>
+            </a:r>
+            <a:r>
               <a:rPr lang="en-US" sz="2000" dirty="0">
                 <a:hlinkClick r:id="rId2"/>
               </a:rPr>
-              <a:t>https://github.com/murrahjm/Infoblox-Classy</a:t>
+              <a:t>://</a:t>
+            </a:r>
+            <a:r>
+              <a:rPr lang="en-US" sz="2000" dirty="0" smtClean="0">
+                <a:hlinkClick r:id="rId2"/>
+              </a:rPr>
+              <a:t>github.com/murrahjm/PSSummit2018</a:t>
+            </a:r>
+          </a:p>
+          <a:p>
+            <a:r>
+              <a:rPr lang="en-US" sz="2000" dirty="0" smtClean="0">
+                <a:hlinkClick r:id="rId2"/>
+              </a:rPr>
+              <a:t>https</a:t>
+            </a:r>
+            <a:r>
+              <a:rPr lang="en-US" sz="2000" dirty="0">
+                <a:hlinkClick r:id="rId2"/>
+              </a:rPr>
+              <a:t>://github.com/murrahjm/Infoblox-Classy</a:t>
             </a:r>
             <a:endParaRPr lang="en-US" sz="2000" dirty="0"/>
           </a:p>
@@ -5086,19 +5119,55 @@
             <a:endParaRPr lang="en-US" sz="2000" dirty="0"/>
           </a:p>
           <a:p>
-            <a:r>
-              <a:rPr lang="en-US" sz="1800" dirty="0">
-                <a:hlinkClick r:id="rId4"/>
-              </a:rPr>
-              <a:t>https://docs.microsoft.com/en-us/powershell/wmf/5.0/class_newtype</a:t>
-            </a:r>
-            <a:endParaRPr lang="en-US" sz="1800" dirty="0"/>
-          </a:p>
-          <a:p>
-            <a:endParaRPr lang="en-US" sz="2000" dirty="0"/>
-          </a:p>
-        </p:txBody>
-      </p:sp>
+            <a:endParaRPr lang="en-US" sz="2000" dirty="0" smtClean="0"/>
+          </a:p>
+        </p:txBody>
+      </p:sp>
+      <p:pic>
+        <p:nvPicPr>
+          <p:cNvPr id="4" name="Picture 3"/>
+          <p:cNvPicPr>
+            <a:picLocks noChangeAspect="1"/>
+          </p:cNvPicPr>
+          <p:nvPr/>
+        </p:nvPicPr>
+        <p:blipFill rotWithShape="1">
+          <a:blip r:embed="rId4">
+            <a:extLst>
+              <a:ext uri="{28A0092B-C50C-407E-A947-70E740481C1C}">
+                <a14:useLocalDpi xmlns:a14="http://schemas.microsoft.com/office/drawing/2010/main" val="0"/>
+              </a:ext>
+            </a:extLst>
+          </a:blip>
+          <a:srcRect l="3782" t="21808" b="23616"/>
+          <a:stretch/>
+        </p:blipFill>
+        <p:spPr>
+          <a:xfrm>
+            <a:off x="3037667" y="3921071"/>
+            <a:ext cx="6762474" cy="2798428"/>
+          </a:xfrm>
+          <a:prstGeom prst="round2DiagRect">
+            <a:avLst>
+              <a:gd name="adj1" fmla="val 16667"/>
+              <a:gd name="adj2" fmla="val 0"/>
+            </a:avLst>
+          </a:prstGeom>
+          <a:ln w="88900" cap="sq">
+            <a:solidFill>
+              <a:srgbClr val="FFFFFF"/>
+            </a:solidFill>
+            <a:miter lim="800000"/>
+          </a:ln>
+          <a:effectLst>
+            <a:outerShdw blurRad="254000" algn="tl" rotWithShape="0">
+              <a:srgbClr val="000000">
+                <a:alpha val="43000"/>
+              </a:srgbClr>
+            </a:outerShdw>
+          </a:effectLst>
+        </p:spPr>
+      </p:pic>
     </p:spTree>
     <p:extLst>
       <p:ext uri="{BB962C8B-B14F-4D97-AF65-F5344CB8AC3E}">
@@ -5109,6 +5178,13 @@
   <p:clrMapOvr>
     <a:masterClrMapping/>
   </p:clrMapOvr>
+  <p:timing>
+    <p:tnLst>
+      <p:par>
+        <p:cTn id="1" dur="indefinite" restart="never" nodeType="tmRoot"/>
+      </p:par>
+    </p:tnLst>
+  </p:timing>
 </p:sld>
 </file>
 
@@ -5139,6 +5215,13 @@
   <p:clrMapOvr>
     <a:masterClrMapping/>
   </p:clrMapOvr>
+  <p:timing>
+    <p:tnLst>
+      <p:par>
+        <p:cTn id="1" dur="indefinite" restart="never" nodeType="tmRoot"/>
+      </p:par>
+    </p:tnLst>
+  </p:timing>
 </p:sld>
 </file>
 
@@ -5331,6 +5414,13 @@
   <p:clrMapOvr>
     <a:masterClrMapping/>
   </p:clrMapOvr>
+  <p:timing>
+    <p:tnLst>
+      <p:par>
+        <p:cTn id="1" dur="indefinite" restart="never" nodeType="tmRoot"/>
+      </p:par>
+    </p:tnLst>
+  </p:timing>
 </p:sld>
 </file>
 
@@ -5432,6 +5522,13 @@
   <p:clrMapOvr>
     <a:masterClrMapping/>
   </p:clrMapOvr>
+  <p:timing>
+    <p:tnLst>
+      <p:par>
+        <p:cTn id="1" dur="indefinite" restart="never" nodeType="tmRoot"/>
+      </p:par>
+    </p:tnLst>
+  </p:timing>
 </p:sld>
 </file>
 
@@ -5840,6 +5937,15 @@
             <a:pPr marL="457200" lvl="1" indent="0">
               <a:buNone/>
             </a:pPr>
+            <a:r>
+              <a:rPr lang="en-US" sz="1400" dirty="0">
+                <a:solidFill>
+                  <a:srgbClr val="333333"/>
+                </a:solidFill>
+                <a:latin typeface="Consolas" panose="020B0609020204030204" pitchFamily="49" charset="0"/>
+              </a:rPr>
+              <a:t/>
+            </a:r>
             <a:br>
               <a:rPr lang="en-US" sz="1400" dirty="0">
                 <a:solidFill>
@@ -6180,6 +6286,13 @@
   <p:clrMapOvr>
     <a:masterClrMapping/>
   </p:clrMapOvr>
+  <p:timing>
+    <p:tnLst>
+      <p:par>
+        <p:cTn id="1" dur="indefinite" restart="never" nodeType="tmRoot"/>
+      </p:par>
+    </p:tnLst>
+  </p:timing>
 </p:sld>
 </file>
 
@@ -6250,6 +6363,51 @@
           </a:p>
         </p:txBody>
       </p:sp>
+      <p:pic>
+        <p:nvPicPr>
+          <p:cNvPr id="4" name="Picture 3"/>
+          <p:cNvPicPr>
+            <a:picLocks noChangeAspect="1"/>
+          </p:cNvPicPr>
+          <p:nvPr/>
+        </p:nvPicPr>
+        <p:blipFill rotWithShape="1">
+          <a:blip r:embed="rId2">
+            <a:extLst>
+              <a:ext uri="{28A0092B-C50C-407E-A947-70E740481C1C}">
+                <a14:useLocalDpi xmlns:a14="http://schemas.microsoft.com/office/drawing/2010/main" val="0"/>
+              </a:ext>
+            </a:extLst>
+          </a:blip>
+          <a:srcRect l="15225" t="15965"/>
+          <a:stretch/>
+        </p:blipFill>
+        <p:spPr>
+          <a:xfrm>
+            <a:off x="6974236" y="1825625"/>
+            <a:ext cx="4379563" cy="3256018"/>
+          </a:xfrm>
+          <a:prstGeom prst="round2DiagRect">
+            <a:avLst>
+              <a:gd name="adj1" fmla="val 16667"/>
+              <a:gd name="adj2" fmla="val 0"/>
+            </a:avLst>
+          </a:prstGeom>
+          <a:ln w="88900" cap="sq">
+            <a:solidFill>
+              <a:srgbClr val="FFFFFF"/>
+            </a:solidFill>
+            <a:miter lim="800000"/>
+          </a:ln>
+          <a:effectLst>
+            <a:outerShdw blurRad="254000" algn="tl" rotWithShape="0">
+              <a:srgbClr val="000000">
+                <a:alpha val="43000"/>
+              </a:srgbClr>
+            </a:outerShdw>
+          </a:effectLst>
+        </p:spPr>
+      </p:pic>
     </p:spTree>
     <p:extLst>
       <p:ext uri="{BB962C8B-B14F-4D97-AF65-F5344CB8AC3E}">
@@ -6260,6 +6418,13 @@
   <p:clrMapOvr>
     <a:masterClrMapping/>
   </p:clrMapOvr>
+  <p:timing>
+    <p:tnLst>
+      <p:par>
+        <p:cTn id="1" dur="indefinite" restart="never" nodeType="tmRoot"/>
+      </p:par>
+    </p:tnLst>
+  </p:timing>
 </p:sld>
 </file>
 
@@ -6318,6 +6483,13 @@
   <p:clrMapOvr>
     <a:masterClrMapping/>
   </p:clrMapOvr>
+  <p:timing>
+    <p:tnLst>
+      <p:par>
+        <p:cTn id="1" dur="indefinite" restart="never" nodeType="tmRoot"/>
+      </p:par>
+    </p:tnLst>
+  </p:timing>
 </p:sld>
 </file>
 
@@ -6382,6 +6554,51 @@
           </a:p>
         </p:txBody>
       </p:sp>
+      <p:pic>
+        <p:nvPicPr>
+          <p:cNvPr id="2" name="Picture 1"/>
+          <p:cNvPicPr>
+            <a:picLocks noChangeAspect="1"/>
+          </p:cNvPicPr>
+          <p:nvPr/>
+        </p:nvPicPr>
+        <p:blipFill rotWithShape="1">
+          <a:blip r:embed="rId2">
+            <a:extLst>
+              <a:ext uri="{28A0092B-C50C-407E-A947-70E740481C1C}">
+                <a14:useLocalDpi xmlns:a14="http://schemas.microsoft.com/office/drawing/2010/main" val="0"/>
+              </a:ext>
+            </a:extLst>
+          </a:blip>
+          <a:srcRect l="450" t="15610" r="-201" b="21219"/>
+          <a:stretch/>
+        </p:blipFill>
+        <p:spPr>
+          <a:xfrm>
+            <a:off x="7439187" y="1709738"/>
+            <a:ext cx="3848020" cy="4014062"/>
+          </a:xfrm>
+          <a:prstGeom prst="round2DiagRect">
+            <a:avLst>
+              <a:gd name="adj1" fmla="val 16667"/>
+              <a:gd name="adj2" fmla="val 0"/>
+            </a:avLst>
+          </a:prstGeom>
+          <a:ln w="88900" cap="sq">
+            <a:solidFill>
+              <a:srgbClr val="FFFFFF"/>
+            </a:solidFill>
+            <a:miter lim="800000"/>
+          </a:ln>
+          <a:effectLst>
+            <a:outerShdw blurRad="254000" algn="tl" rotWithShape="0">
+              <a:srgbClr val="000000">
+                <a:alpha val="43000"/>
+              </a:srgbClr>
+            </a:outerShdw>
+          </a:effectLst>
+        </p:spPr>
+      </p:pic>
     </p:spTree>
     <p:extLst>
       <p:ext uri="{BB962C8B-B14F-4D97-AF65-F5344CB8AC3E}">
@@ -6392,6 +6609,13 @@
   <p:clrMapOvr>
     <a:masterClrMapping/>
   </p:clrMapOvr>
+  <p:timing>
+    <p:tnLst>
+      <p:par>
+        <p:cTn id="1" dur="indefinite" restart="never" nodeType="tmRoot"/>
+      </p:par>
+    </p:tnLst>
+  </p:timing>
 </p:sld>
 </file>
 
@@ -6942,6 +7166,13 @@
   <p:clrMapOvr>
     <a:masterClrMapping/>
   </p:clrMapOvr>
+  <p:timing>
+    <p:tnLst>
+      <p:par>
+        <p:cTn id="1" dur="indefinite" restart="never" nodeType="tmRoot"/>
+      </p:par>
+    </p:tnLst>
+  </p:timing>
 </p:sld>
 </file>
 

</xml_diff>